<commit_message>
week 12 session 2
</commit_message>
<xml_diff>
--- a/lectures/12/2_Analysis and Interpretation Multiple Variables Simultaneously.pptx
+++ b/lectures/12/2_Analysis and Interpretation Multiple Variables Simultaneously.pptx
@@ -3333,7 +3333,7 @@
           <a:p>
             <a:fld id="{73B2889B-A0AC-4482-8592-5C96F2309420}" type="datetimeFigureOut">
               <a:rPr lang="en-US" smtClean="0"/>
-              <a:t>4/10/2022</a:t>
+              <a:t>4/12/2022</a:t>
             </a:fld>
             <a:endParaRPr lang="en-US"/>
           </a:p>
@@ -3510,7 +3510,7 @@
           <a:p>
             <a:fld id="{830EB223-FFC0-462A-A3B8-EAA7CE0F8CBD}" type="datetimeFigureOut">
               <a:rPr lang="en-US" smtClean="0"/>
-              <a:t>4/10/2022</a:t>
+              <a:t>4/12/2022</a:t>
             </a:fld>
             <a:endParaRPr lang="en-US" dirty="0"/>
           </a:p>
@@ -4391,7 +4391,40 @@
           <a:bodyPr/>
           <a:lstStyle/>
           <a:p>
+            <a:r>
+              <a:rPr lang="en-US" dirty="0"/>
+              <a:t>Excel: </a:t>
+            </a:r>
+            <a:r>
+              <a:rPr lang="en-US" dirty="0" err="1"/>
+              <a:t>softserve</a:t>
+            </a:r>
+            <a:r>
+              <a:rPr lang="en-US" dirty="0"/>
+              <a:t> + online return (under regression)</a:t>
+            </a:r>
+          </a:p>
+          <a:p>
             <a:endParaRPr lang="en-US" dirty="0"/>
+          </a:p>
+          <a:p>
+            <a:r>
+              <a:rPr lang="en-US" dirty="0" err="1"/>
+              <a:t>Rcloud</a:t>
+            </a:r>
+            <a:r>
+              <a:rPr lang="en-US" dirty="0"/>
+              <a:t>: discussion case + virtual </a:t>
+            </a:r>
+            <a:r>
+              <a:rPr lang="en-US"/>
+              <a:t>career service example</a:t>
+            </a:r>
+            <a:r>
+              <a:rPr lang="en-US" dirty="0"/>
+              <a:t> </a:t>
+            </a:r>
+            <a:endParaRPr lang="en-US"/>
           </a:p>
         </p:txBody>
       </p:sp>
@@ -5445,7 +5478,7 @@
           <a:p>
             <a:fld id="{DECF21A4-E71B-4D3A-AF45-E989C23A7BB1}" type="datetimeFigureOut">
               <a:rPr lang="en-US" smtClean="0"/>
-              <a:t>4/10/2022</a:t>
+              <a:t>4/12/2022</a:t>
             </a:fld>
             <a:endParaRPr lang="en-US" dirty="0"/>
           </a:p>
@@ -5643,7 +5676,7 @@
           <a:p>
             <a:fld id="{DECF21A4-E71B-4D3A-AF45-E989C23A7BB1}" type="datetimeFigureOut">
               <a:rPr lang="en-US" smtClean="0"/>
-              <a:t>4/10/2022</a:t>
+              <a:t>4/12/2022</a:t>
             </a:fld>
             <a:endParaRPr lang="en-US" dirty="0"/>
           </a:p>
@@ -5851,7 +5884,7 @@
           <a:p>
             <a:fld id="{DECF21A4-E71B-4D3A-AF45-E989C23A7BB1}" type="datetimeFigureOut">
               <a:rPr lang="en-US" smtClean="0"/>
-              <a:t>4/10/2022</a:t>
+              <a:t>4/12/2022</a:t>
             </a:fld>
             <a:endParaRPr lang="en-US" dirty="0"/>
           </a:p>
@@ -6049,7 +6082,7 @@
           <a:p>
             <a:fld id="{DECF21A4-E71B-4D3A-AF45-E989C23A7BB1}" type="datetimeFigureOut">
               <a:rPr lang="en-US" smtClean="0"/>
-              <a:t>4/10/2022</a:t>
+              <a:t>4/12/2022</a:t>
             </a:fld>
             <a:endParaRPr lang="en-US" dirty="0"/>
           </a:p>
@@ -6324,7 +6357,7 @@
           <a:p>
             <a:fld id="{DECF21A4-E71B-4D3A-AF45-E989C23A7BB1}" type="datetimeFigureOut">
               <a:rPr lang="en-US" smtClean="0"/>
-              <a:t>4/10/2022</a:t>
+              <a:t>4/12/2022</a:t>
             </a:fld>
             <a:endParaRPr lang="en-US" dirty="0"/>
           </a:p>
@@ -6589,7 +6622,7 @@
           <a:p>
             <a:fld id="{DECF21A4-E71B-4D3A-AF45-E989C23A7BB1}" type="datetimeFigureOut">
               <a:rPr lang="en-US" smtClean="0"/>
-              <a:t>4/10/2022</a:t>
+              <a:t>4/12/2022</a:t>
             </a:fld>
             <a:endParaRPr lang="en-US" dirty="0"/>
           </a:p>
@@ -7001,7 +7034,7 @@
           <a:p>
             <a:fld id="{DECF21A4-E71B-4D3A-AF45-E989C23A7BB1}" type="datetimeFigureOut">
               <a:rPr lang="en-US" smtClean="0"/>
-              <a:t>4/10/2022</a:t>
+              <a:t>4/12/2022</a:t>
             </a:fld>
             <a:endParaRPr lang="en-US" dirty="0"/>
           </a:p>
@@ -7142,7 +7175,7 @@
           <a:p>
             <a:fld id="{DECF21A4-E71B-4D3A-AF45-E989C23A7BB1}" type="datetimeFigureOut">
               <a:rPr lang="en-US" smtClean="0"/>
-              <a:t>4/10/2022</a:t>
+              <a:t>4/12/2022</a:t>
             </a:fld>
             <a:endParaRPr lang="en-US" dirty="0"/>
           </a:p>
@@ -7255,7 +7288,7 @@
           <a:p>
             <a:fld id="{DECF21A4-E71B-4D3A-AF45-E989C23A7BB1}" type="datetimeFigureOut">
               <a:rPr lang="en-US" smtClean="0"/>
-              <a:t>4/10/2022</a:t>
+              <a:t>4/12/2022</a:t>
             </a:fld>
             <a:endParaRPr lang="en-US" dirty="0"/>
           </a:p>
@@ -7566,7 +7599,7 @@
           <a:p>
             <a:fld id="{DECF21A4-E71B-4D3A-AF45-E989C23A7BB1}" type="datetimeFigureOut">
               <a:rPr lang="en-US" smtClean="0"/>
-              <a:t>4/10/2022</a:t>
+              <a:t>4/12/2022</a:t>
             </a:fld>
             <a:endParaRPr lang="en-US" dirty="0"/>
           </a:p>
@@ -7858,7 +7891,7 @@
           <a:p>
             <a:fld id="{DECF21A4-E71B-4D3A-AF45-E989C23A7BB1}" type="datetimeFigureOut">
               <a:rPr lang="en-US" smtClean="0"/>
-              <a:t>4/10/2022</a:t>
+              <a:t>4/12/2022</a:t>
             </a:fld>
             <a:endParaRPr lang="en-US" dirty="0"/>
           </a:p>
@@ -8099,7 +8132,7 @@
           <a:p>
             <a:fld id="{DECF21A4-E71B-4D3A-AF45-E989C23A7BB1}" type="datetimeFigureOut">
               <a:rPr lang="en-US" smtClean="0"/>
-              <a:t>4/10/2022</a:t>
+              <a:t>4/12/2022</a:t>
             </a:fld>
             <a:endParaRPr lang="en-US" dirty="0"/>
           </a:p>
@@ -25178,6 +25211,186 @@
   <p:clrMapOvr>
     <a:masterClrMapping/>
   </p:clrMapOvr>
+  <p:timing>
+    <p:tnLst>
+      <p:par>
+        <p:cTn id="1" dur="indefinite" restart="never" nodeType="tmRoot">
+          <p:childTnLst>
+            <p:seq concurrent="1" nextAc="seek">
+              <p:cTn id="2" dur="indefinite" nodeType="mainSeq">
+                <p:childTnLst>
+                  <p:par>
+                    <p:cTn id="3" fill="hold">
+                      <p:stCondLst>
+                        <p:cond delay="indefinite"/>
+                      </p:stCondLst>
+                      <p:childTnLst>
+                        <p:par>
+                          <p:cTn id="4" fill="hold">
+                            <p:stCondLst>
+                              <p:cond delay="0"/>
+                            </p:stCondLst>
+                            <p:childTnLst>
+                              <p:par>
+                                <p:cTn id="5" presetID="1" presetClass="entr" presetSubtype="0" fill="hold" grpId="0" nodeType="clickEffect">
+                                  <p:stCondLst>
+                                    <p:cond delay="0"/>
+                                  </p:stCondLst>
+                                  <p:childTnLst>
+                                    <p:set>
+                                      <p:cBhvr>
+                                        <p:cTn id="6" dur="1" fill="hold">
+                                          <p:stCondLst>
+                                            <p:cond delay="0"/>
+                                          </p:stCondLst>
+                                        </p:cTn>
+                                        <p:tgtEl>
+                                          <p:spTgt spid="3">
+                                            <p:txEl>
+                                              <p:pRg st="0" end="0"/>
+                                            </p:txEl>
+                                          </p:spTgt>
+                                        </p:tgtEl>
+                                        <p:attrNameLst>
+                                          <p:attrName>style.visibility</p:attrName>
+                                        </p:attrNameLst>
+                                      </p:cBhvr>
+                                      <p:to>
+                                        <p:strVal val="visible"/>
+                                      </p:to>
+                                    </p:set>
+                                  </p:childTnLst>
+                                </p:cTn>
+                              </p:par>
+                            </p:childTnLst>
+                          </p:cTn>
+                        </p:par>
+                      </p:childTnLst>
+                    </p:cTn>
+                  </p:par>
+                  <p:par>
+                    <p:cTn id="7" fill="hold">
+                      <p:stCondLst>
+                        <p:cond delay="indefinite"/>
+                      </p:stCondLst>
+                      <p:childTnLst>
+                        <p:par>
+                          <p:cTn id="8" fill="hold">
+                            <p:stCondLst>
+                              <p:cond delay="0"/>
+                            </p:stCondLst>
+                            <p:childTnLst>
+                              <p:par>
+                                <p:cTn id="9" presetID="1" presetClass="entr" presetSubtype="0" fill="hold" grpId="0" nodeType="clickEffect">
+                                  <p:stCondLst>
+                                    <p:cond delay="0"/>
+                                  </p:stCondLst>
+                                  <p:childTnLst>
+                                    <p:set>
+                                      <p:cBhvr>
+                                        <p:cTn id="10" dur="1" fill="hold">
+                                          <p:stCondLst>
+                                            <p:cond delay="0"/>
+                                          </p:stCondLst>
+                                        </p:cTn>
+                                        <p:tgtEl>
+                                          <p:spTgt spid="3">
+                                            <p:txEl>
+                                              <p:pRg st="1" end="1"/>
+                                            </p:txEl>
+                                          </p:spTgt>
+                                        </p:tgtEl>
+                                        <p:attrNameLst>
+                                          <p:attrName>style.visibility</p:attrName>
+                                        </p:attrNameLst>
+                                      </p:cBhvr>
+                                      <p:to>
+                                        <p:strVal val="visible"/>
+                                      </p:to>
+                                    </p:set>
+                                  </p:childTnLst>
+                                </p:cTn>
+                              </p:par>
+                            </p:childTnLst>
+                          </p:cTn>
+                        </p:par>
+                      </p:childTnLst>
+                    </p:cTn>
+                  </p:par>
+                  <p:par>
+                    <p:cTn id="11" fill="hold">
+                      <p:stCondLst>
+                        <p:cond delay="indefinite"/>
+                      </p:stCondLst>
+                      <p:childTnLst>
+                        <p:par>
+                          <p:cTn id="12" fill="hold">
+                            <p:stCondLst>
+                              <p:cond delay="0"/>
+                            </p:stCondLst>
+                            <p:childTnLst>
+                              <p:par>
+                                <p:cTn id="13" presetID="1" presetClass="entr" presetSubtype="0" fill="hold" grpId="0" nodeType="clickEffect">
+                                  <p:stCondLst>
+                                    <p:cond delay="0"/>
+                                  </p:stCondLst>
+                                  <p:childTnLst>
+                                    <p:set>
+                                      <p:cBhvr>
+                                        <p:cTn id="14" dur="1" fill="hold">
+                                          <p:stCondLst>
+                                            <p:cond delay="0"/>
+                                          </p:stCondLst>
+                                        </p:cTn>
+                                        <p:tgtEl>
+                                          <p:spTgt spid="3">
+                                            <p:txEl>
+                                              <p:pRg st="2" end="2"/>
+                                            </p:txEl>
+                                          </p:spTgt>
+                                        </p:tgtEl>
+                                        <p:attrNameLst>
+                                          <p:attrName>style.visibility</p:attrName>
+                                        </p:attrNameLst>
+                                      </p:cBhvr>
+                                      <p:to>
+                                        <p:strVal val="visible"/>
+                                      </p:to>
+                                    </p:set>
+                                  </p:childTnLst>
+                                </p:cTn>
+                              </p:par>
+                            </p:childTnLst>
+                          </p:cTn>
+                        </p:par>
+                      </p:childTnLst>
+                    </p:cTn>
+                  </p:par>
+                </p:childTnLst>
+              </p:cTn>
+              <p:prevCondLst>
+                <p:cond evt="onPrev" delay="0">
+                  <p:tgtEl>
+                    <p:sldTgt/>
+                  </p:tgtEl>
+                </p:cond>
+              </p:prevCondLst>
+              <p:nextCondLst>
+                <p:cond evt="onNext" delay="0">
+                  <p:tgtEl>
+                    <p:sldTgt/>
+                  </p:tgtEl>
+                </p:cond>
+              </p:nextCondLst>
+            </p:seq>
+          </p:childTnLst>
+        </p:cTn>
+      </p:par>
+    </p:tnLst>
+    <p:bldLst>
+      <p:bldP spid="3" grpId="0" build="p"/>
+    </p:bldLst>
+  </p:timing>
 </p:sld>
 </file>
 
@@ -26525,7 +26738,7 @@
           <a:lstStyle/>
           <a:p>
             <a:r>
-              <a:rPr lang="en-US" sz="5000"/>
+              <a:rPr lang="en-US" sz="5000" dirty="0"/>
               <a:t>Presentation Critique</a:t>
             </a:r>
           </a:p>
@@ -26903,45 +27116,45 @@
           <a:lstStyle/>
           <a:p>
             <a:r>
-              <a:rPr lang="en-US" sz="2200"/>
+              <a:rPr lang="en-US" sz="2200" dirty="0"/>
               <a:t>All groups that are not presenting need to submit a presentation critique for the presentation group (1 submission per group)</a:t>
             </a:r>
           </a:p>
           <a:p>
             <a:r>
-              <a:rPr lang="en-US" sz="2200"/>
+              <a:rPr lang="en-US" sz="2200" dirty="0"/>
               <a:t>Assignment 10: </a:t>
             </a:r>
           </a:p>
           <a:p>
             <a:pPr lvl="1"/>
             <a:r>
-              <a:rPr lang="en-US" sz="2200"/>
+              <a:rPr lang="en-US" sz="2200" dirty="0"/>
               <a:t>Presentation submission: 5 points </a:t>
             </a:r>
           </a:p>
           <a:p>
             <a:pPr lvl="1"/>
             <a:r>
-              <a:rPr lang="en-US" sz="2200"/>
+              <a:rPr lang="en-US" sz="2200" dirty="0"/>
               <a:t>Instructor’s evaluation: 5 points </a:t>
             </a:r>
           </a:p>
           <a:p>
             <a:pPr lvl="1"/>
             <a:r>
-              <a:rPr lang="en-US" sz="2200"/>
+              <a:rPr lang="en-US" sz="2200" dirty="0"/>
               <a:t>Peer’s evaluation: 10 points (it’s important to communicate your findings)</a:t>
             </a:r>
           </a:p>
           <a:p>
             <a:r>
-              <a:rPr lang="en-US" sz="2200">
+              <a:rPr lang="en-US" sz="2200" dirty="0">
                 <a:hlinkClick r:id="rId3"/>
               </a:rPr>
               <a:t>Presentation Evaluation Assignment</a:t>
             </a:r>
-            <a:endParaRPr lang="en-US" sz="2200"/>
+            <a:endParaRPr lang="en-US" sz="2200" dirty="0"/>
           </a:p>
         </p:txBody>
       </p:sp>
@@ -33785,6 +33998,23 @@
 </file>
 
 <file path=customXml/item1.xml><?xml version="1.0" encoding="utf-8"?>
+<p:properties xmlns:p="http://schemas.microsoft.com/office/2006/metadata/properties" xmlns:xsi="http://www.w3.org/2001/XMLSchema-instance" xmlns:pc="http://schemas.microsoft.com/office/infopath/2007/PartnerControls">
+  <documentManagement>
+    <MediaServiceKeyPoints xmlns="71af3243-3dd4-4a8d-8c0d-dd76da1f02a5" xsi:nil="true"/>
+  </documentManagement>
+</p:properties>
+</file>
+
+<file path=customXml/item2.xml><?xml version="1.0" encoding="utf-8"?>
+<?mso-contentType ?>
+<FormTemplates xmlns="http://schemas.microsoft.com/sharepoint/v3/contenttype/forms">
+  <Display>DocumentLibraryForm</Display>
+  <Edit>DocumentLibraryForm</Edit>
+  <New>DocumentLibraryForm</New>
+</FormTemplates>
+</file>
+
+<file path=customXml/item3.xml><?xml version="1.0" encoding="utf-8"?>
 <ct:contentTypeSchema xmlns:ct="http://schemas.microsoft.com/office/2006/metadata/contentType" xmlns:ma="http://schemas.microsoft.com/office/2006/metadata/properties/metaAttributes" ct:_="" ma:_="" ma:contentTypeName="Document" ma:contentTypeID="0x01010079F111ED35F8CC479449609E8A0923A6" ma:contentTypeVersion="11" ma:contentTypeDescription="Create a new document." ma:contentTypeScope="" ma:versionID="96291512c1ee715ab617f4c07df79fc1">
   <xsd:schema xmlns:xsd="http://www.w3.org/2001/XMLSchema" xmlns:xs="http://www.w3.org/2001/XMLSchema" xmlns:p="http://schemas.microsoft.com/office/2006/metadata/properties" xmlns:ns2="71af3243-3dd4-4a8d-8c0d-dd76da1f02a5" xmlns:ns3="16c05727-aa75-4e4a-9b5f-8a80a1165891" targetNamespace="http://schemas.microsoft.com/office/2006/metadata/properties" ma:root="true" ma:fieldsID="8256c27c40ca5c40ce1cf6c44f0205df" ns2:_="" ns3:_="">
     <xsd:import namespace="71af3243-3dd4-4a8d-8c0d-dd76da1f02a5"/>
@@ -33995,24 +34225,25 @@
 </ct:contentTypeSchema>
 </file>
 
-<file path=customXml/item2.xml><?xml version="1.0" encoding="utf-8"?>
-<p:properties xmlns:p="http://schemas.microsoft.com/office/2006/metadata/properties" xmlns:xsi="http://www.w3.org/2001/XMLSchema-instance" xmlns:pc="http://schemas.microsoft.com/office/infopath/2007/PartnerControls">
-  <documentManagement>
-    <MediaServiceKeyPoints xmlns="71af3243-3dd4-4a8d-8c0d-dd76da1f02a5" xsi:nil="true"/>
-  </documentManagement>
-</p:properties>
+<file path=customXml/itemProps1.xml><?xml version="1.0" encoding="utf-8"?>
+<ds:datastoreItem xmlns:ds="http://schemas.openxmlformats.org/officeDocument/2006/customXml" ds:itemID="{03C7D9E6-B0D9-433E-BD46-EB60F64F4DA8}">
+  <ds:schemaRefs>
+    <ds:schemaRef ds:uri="http://schemas.microsoft.com/office/2006/metadata/properties"/>
+    <ds:schemaRef ds:uri="http://schemas.microsoft.com/office/infopath/2007/PartnerControls"/>
+    <ds:schemaRef ds:uri="71af3243-3dd4-4a8d-8c0d-dd76da1f02a5"/>
+  </ds:schemaRefs>
+</ds:datastoreItem>
 </file>
 
-<file path=customXml/item3.xml><?xml version="1.0" encoding="utf-8"?>
-<?mso-contentType ?>
-<FormTemplates xmlns="http://schemas.microsoft.com/sharepoint/v3/contenttype/forms">
-  <Display>DocumentLibraryForm</Display>
-  <Edit>DocumentLibraryForm</Edit>
-  <New>DocumentLibraryForm</New>
-</FormTemplates>
+<file path=customXml/itemProps2.xml><?xml version="1.0" encoding="utf-8"?>
+<ds:datastoreItem xmlns:ds="http://schemas.openxmlformats.org/officeDocument/2006/customXml" ds:itemID="{5CA875DA-F9FD-4F83-A049-3B1027B542DE}">
+  <ds:schemaRefs>
+    <ds:schemaRef ds:uri="http://schemas.microsoft.com/sharepoint/v3/contenttype/forms"/>
+  </ds:schemaRefs>
+</ds:datastoreItem>
 </file>
 
-<file path=customXml/itemProps1.xml><?xml version="1.0" encoding="utf-8"?>
+<file path=customXml/itemProps3.xml><?xml version="1.0" encoding="utf-8"?>
 <ds:datastoreItem xmlns:ds="http://schemas.openxmlformats.org/officeDocument/2006/customXml" ds:itemID="{B2AB02E3-5ADF-4BF0-9C1B-35CDF3FE95B0}">
   <ds:schemaRefs>
     <ds:schemaRef ds:uri="http://schemas.microsoft.com/office/2006/metadata/contentType"/>
@@ -34029,22 +34260,4 @@
     <ds:schemaRef ds:uri="http://schemas.microsoft.com/internal/obd"/>
   </ds:schemaRefs>
 </ds:datastoreItem>
-</file>
-
-<file path=customXml/itemProps2.xml><?xml version="1.0" encoding="utf-8"?>
-<ds:datastoreItem xmlns:ds="http://schemas.openxmlformats.org/officeDocument/2006/customXml" ds:itemID="{03C7D9E6-B0D9-433E-BD46-EB60F64F4DA8}">
-  <ds:schemaRefs>
-    <ds:schemaRef ds:uri="http://schemas.microsoft.com/office/2006/metadata/properties"/>
-    <ds:schemaRef ds:uri="http://schemas.microsoft.com/office/infopath/2007/PartnerControls"/>
-    <ds:schemaRef ds:uri="71af3243-3dd4-4a8d-8c0d-dd76da1f02a5"/>
-  </ds:schemaRefs>
-</ds:datastoreItem>
-</file>
-
-<file path=customXml/itemProps3.xml><?xml version="1.0" encoding="utf-8"?>
-<ds:datastoreItem xmlns:ds="http://schemas.openxmlformats.org/officeDocument/2006/customXml" ds:itemID="{5CA875DA-F9FD-4F83-A049-3B1027B542DE}">
-  <ds:schemaRefs>
-    <ds:schemaRef ds:uri="http://schemas.microsoft.com/sharepoint/v3/contenttype/forms"/>
-  </ds:schemaRefs>
-</ds:datastoreItem>
 </file>
</xml_diff>